<commit_message>
Final Changes to ppt and code before Presentation
</commit_message>
<xml_diff>
--- a/Presentation/VQM-STRATEGY.pptx
+++ b/Presentation/VQM-STRATEGY.pptx
@@ -5,10 +5,10 @@
     <p:sldMasterId id="2147483744" r:id="rId1"/>
   </p:sldMasterIdLst>
   <p:notesMasterIdLst>
-    <p:notesMasterId r:id="rId18"/>
+    <p:notesMasterId r:id="rId19"/>
   </p:notesMasterIdLst>
   <p:handoutMasterIdLst>
-    <p:handoutMasterId r:id="rId19"/>
+    <p:handoutMasterId r:id="rId20"/>
   </p:handoutMasterIdLst>
   <p:sldIdLst>
     <p:sldId id="256" r:id="rId2"/>
@@ -20,13 +20,14 @@
     <p:sldId id="298" r:id="rId8"/>
     <p:sldId id="293" r:id="rId9"/>
     <p:sldId id="294" r:id="rId10"/>
-    <p:sldId id="295" r:id="rId11"/>
-    <p:sldId id="300" r:id="rId12"/>
-    <p:sldId id="296" r:id="rId13"/>
-    <p:sldId id="297" r:id="rId14"/>
-    <p:sldId id="299" r:id="rId15"/>
-    <p:sldId id="302" r:id="rId16"/>
-    <p:sldId id="303" r:id="rId17"/>
+    <p:sldId id="304" r:id="rId11"/>
+    <p:sldId id="295" r:id="rId12"/>
+    <p:sldId id="300" r:id="rId13"/>
+    <p:sldId id="296" r:id="rId14"/>
+    <p:sldId id="297" r:id="rId15"/>
+    <p:sldId id="299" r:id="rId16"/>
+    <p:sldId id="302" r:id="rId17"/>
+    <p:sldId id="303" r:id="rId18"/>
   </p:sldIdLst>
   <p:sldSz cx="12192000" cy="6858000"/>
   <p:notesSz cx="6858000" cy="9144000"/>
@@ -2639,7 +2640,7 @@
             <a:pPr rtl="0"/>
             <a:fld id="{BE60DC36-8EFA-4378-9855-E019C55AC472}" type="slidenum">
               <a:rPr lang="en-US" smtClean="0"/>
-              <a:t>10</a:t>
+              <a:t>11</a:t>
             </a:fld>
             <a:endParaRPr lang="en-US" dirty="0"/>
           </a:p>
@@ -2724,7 +2725,7 @@
             <a:pPr rtl="0"/>
             <a:fld id="{BE60DC36-8EFA-4378-9855-E019C55AC472}" type="slidenum">
               <a:rPr lang="en-US" smtClean="0"/>
-              <a:t>11</a:t>
+              <a:t>12</a:t>
             </a:fld>
             <a:endParaRPr lang="en-US" dirty="0"/>
           </a:p>
@@ -2809,7 +2810,7 @@
             <a:pPr rtl="0"/>
             <a:fld id="{BE60DC36-8EFA-4378-9855-E019C55AC472}" type="slidenum">
               <a:rPr lang="en-US" smtClean="0"/>
-              <a:t>14</a:t>
+              <a:t>15</a:t>
             </a:fld>
             <a:endParaRPr lang="en-US" dirty="0"/>
           </a:p>
@@ -2894,7 +2895,7 @@
             <a:pPr rtl="0"/>
             <a:fld id="{BE60DC36-8EFA-4378-9855-E019C55AC472}" type="slidenum">
               <a:rPr lang="en-US" smtClean="0"/>
-              <a:t>15</a:t>
+              <a:t>16</a:t>
             </a:fld>
             <a:endParaRPr lang="en-US" dirty="0"/>
           </a:p>
@@ -6862,6 +6863,306 @@
           <a:chExt cx="0" cy="0"/>
         </a:xfrm>
       </p:grpSpPr>
+      <p:sp>
+        <p:nvSpPr>
+          <p:cNvPr id="2" name="TextBox 1">
+            <a:extLst>
+              <a:ext uri="{FF2B5EF4-FFF2-40B4-BE49-F238E27FC236}">
+                <a16:creationId xmlns:a16="http://schemas.microsoft.com/office/drawing/2014/main" id="{A8933896-BE87-C338-5A76-F6879913F2F2}"/>
+              </a:ext>
+            </a:extLst>
+          </p:cNvPr>
+          <p:cNvSpPr txBox="1"/>
+          <p:nvPr/>
+        </p:nvSpPr>
+        <p:spPr>
+          <a:xfrm>
+            <a:off x="2633931" y="5715466"/>
+            <a:ext cx="7211684" cy="769441"/>
+          </a:xfrm>
+          <a:prstGeom prst="rect">
+            <a:avLst/>
+          </a:prstGeom>
+          <a:noFill/>
+        </p:spPr>
+        <p:txBody>
+          <a:bodyPr wrap="square" rtlCol="0">
+            <a:spAutoFit/>
+          </a:bodyPr>
+          <a:lstStyle/>
+          <a:p>
+            <a:r>
+              <a:rPr lang="de-DE" sz="4400" b="1" dirty="0">
+                <a:latin typeface="Aptos" panose="020B0004020202020204" pitchFamily="34" charset="0"/>
+              </a:rPr>
+              <a:t>LET‘S DIVE INTO THE CODE</a:t>
+            </a:r>
+            <a:endParaRPr lang="fr-FR" sz="4400" b="1" dirty="0">
+              <a:latin typeface="Aptos" panose="020B0004020202020204" pitchFamily="34" charset="0"/>
+            </a:endParaRPr>
+          </a:p>
+        </p:txBody>
+      </p:sp>
+      <p:pic>
+        <p:nvPicPr>
+          <p:cNvPr id="4" name="Picture 3">
+            <a:extLst>
+              <a:ext uri="{FF2B5EF4-FFF2-40B4-BE49-F238E27FC236}">
+                <a16:creationId xmlns:a16="http://schemas.microsoft.com/office/drawing/2014/main" id="{438DC724-CC21-8F2B-0176-6CC96E8BD9CB}"/>
+              </a:ext>
+            </a:extLst>
+          </p:cNvPr>
+          <p:cNvPicPr>
+            <a:picLocks noChangeAspect="1"/>
+          </p:cNvPicPr>
+          <p:nvPr/>
+        </p:nvPicPr>
+        <p:blipFill>
+          <a:blip r:embed="rId2">
+            <a:extLst>
+              <a:ext uri="{28A0092B-C50C-407E-A947-70E740481C1C}">
+                <a14:useLocalDpi xmlns:a14="http://schemas.microsoft.com/office/drawing/2010/main" val="0"/>
+              </a:ext>
+            </a:extLst>
+          </a:blip>
+          <a:stretch>
+            <a:fillRect/>
+          </a:stretch>
+        </p:blipFill>
+        <p:spPr>
+          <a:xfrm rot="19746374">
+            <a:off x="1023080" y="2279556"/>
+            <a:ext cx="3927404" cy="2060465"/>
+          </a:xfrm>
+          <a:prstGeom prst="rect">
+            <a:avLst/>
+          </a:prstGeom>
+        </p:spPr>
+      </p:pic>
+      <p:pic>
+        <p:nvPicPr>
+          <p:cNvPr id="1028" name="Picture 4" descr="Programming languages: Python's new developer in residence and their  'make-it-or-break-it' role | ZDNET">
+            <a:extLst>
+              <a:ext uri="{FF2B5EF4-FFF2-40B4-BE49-F238E27FC236}">
+                <a16:creationId xmlns:a16="http://schemas.microsoft.com/office/drawing/2014/main" id="{38D1D8BB-E718-36AE-D53F-0AE39253BED7}"/>
+              </a:ext>
+            </a:extLst>
+          </p:cNvPr>
+          <p:cNvPicPr>
+            <a:picLocks noChangeAspect="1" noChangeArrowheads="1"/>
+          </p:cNvPicPr>
+          <p:nvPr/>
+        </p:nvPicPr>
+        <p:blipFill>
+          <a:blip r:embed="rId3">
+            <a:extLst>
+              <a:ext uri="{BEBA8EAE-BF5A-486C-A8C5-ECC9F3942E4B}">
+                <a14:imgProps xmlns:a14="http://schemas.microsoft.com/office/drawing/2010/main">
+                  <a14:imgLayer r:embed="rId4">
+                    <a14:imgEffect>
+                      <a14:saturation sat="0"/>
+                    </a14:imgEffect>
+                  </a14:imgLayer>
+                </a14:imgProps>
+              </a:ext>
+              <a:ext uri="{28A0092B-C50C-407E-A947-70E740481C1C}">
+                <a14:useLocalDpi xmlns:a14="http://schemas.microsoft.com/office/drawing/2010/main" val="0"/>
+              </a:ext>
+            </a:extLst>
+          </a:blip>
+          <a:srcRect/>
+          <a:stretch>
+            <a:fillRect/>
+          </a:stretch>
+        </p:blipFill>
+        <p:spPr bwMode="auto">
+          <a:xfrm>
+            <a:off x="4621891" y="586596"/>
+            <a:ext cx="6529187" cy="4442603"/>
+          </a:xfrm>
+          <a:prstGeom prst="rect">
+            <a:avLst/>
+          </a:prstGeom>
+          <a:ln>
+            <a:noFill/>
+          </a:ln>
+          <a:effectLst>
+            <a:softEdge rad="112500"/>
+          </a:effectLst>
+          <a:extLst>
+            <a:ext uri="{909E8E84-426E-40DD-AFC4-6F175D3DCCD1}">
+              <a14:hiddenFill xmlns:a14="http://schemas.microsoft.com/office/drawing/2010/main">
+                <a:solidFill>
+                  <a:srgbClr val="FFFFFF"/>
+                </a:solidFill>
+              </a14:hiddenFill>
+            </a:ext>
+          </a:extLst>
+        </p:spPr>
+      </p:pic>
+    </p:spTree>
+    <p:extLst>
+      <p:ext uri="{BB962C8B-B14F-4D97-AF65-F5344CB8AC3E}">
+        <p14:creationId xmlns:p14="http://schemas.microsoft.com/office/powerpoint/2010/main" val="1792656372"/>
+      </p:ext>
+    </p:extLst>
+  </p:cSld>
+  <p:clrMapOvr>
+    <a:masterClrMapping/>
+  </p:clrMapOvr>
+  <mc:AlternateContent xmlns:mc="http://schemas.openxmlformats.org/markup-compatibility/2006" xmlns:p14="http://schemas.microsoft.com/office/powerpoint/2010/main">
+    <mc:Choice Requires="p14">
+      <p:transition spd="slow" p14:dur="1500">
+        <p:pull/>
+      </p:transition>
+    </mc:Choice>
+    <mc:Fallback xmlns="">
+      <p:transition spd="slow">
+        <p:pull/>
+      </p:transition>
+    </mc:Fallback>
+  </mc:AlternateContent>
+  <p:timing>
+    <p:tnLst>
+      <p:par>
+        <p:cTn id="1" dur="indefinite" restart="never" nodeType="tmRoot">
+          <p:childTnLst>
+            <p:seq concurrent="1" nextAc="seek">
+              <p:cTn id="2" dur="indefinite" nodeType="mainSeq">
+                <p:childTnLst>
+                  <p:par>
+                    <p:cTn id="3" fill="hold">
+                      <p:stCondLst>
+                        <p:cond delay="indefinite"/>
+                      </p:stCondLst>
+                      <p:childTnLst>
+                        <p:par>
+                          <p:cTn id="4" fill="hold">
+                            <p:stCondLst>
+                              <p:cond delay="0"/>
+                            </p:stCondLst>
+                            <p:childTnLst>
+                              <p:par>
+                                <p:cTn id="5" presetID="2" presetClass="entr" presetSubtype="8" fill="hold" nodeType="clickEffect">
+                                  <p:stCondLst>
+                                    <p:cond delay="0"/>
+                                  </p:stCondLst>
+                                  <p:childTnLst>
+                                    <p:set>
+                                      <p:cBhvr>
+                                        <p:cTn id="6" dur="1" fill="hold">
+                                          <p:stCondLst>
+                                            <p:cond delay="0"/>
+                                          </p:stCondLst>
+                                        </p:cTn>
+                                        <p:tgtEl>
+                                          <p:spTgt spid="4"/>
+                                        </p:tgtEl>
+                                        <p:attrNameLst>
+                                          <p:attrName>style.visibility</p:attrName>
+                                        </p:attrNameLst>
+                                      </p:cBhvr>
+                                      <p:to>
+                                        <p:strVal val="visible"/>
+                                      </p:to>
+                                    </p:set>
+                                    <p:anim calcmode="lin" valueType="num">
+                                      <p:cBhvr additive="base">
+                                        <p:cTn id="7" dur="1500" fill="hold"/>
+                                        <p:tgtEl>
+                                          <p:spTgt spid="4"/>
+                                        </p:tgtEl>
+                                        <p:attrNameLst>
+                                          <p:attrName>ppt_x</p:attrName>
+                                        </p:attrNameLst>
+                                      </p:cBhvr>
+                                      <p:tavLst>
+                                        <p:tav tm="0">
+                                          <p:val>
+                                            <p:strVal val="0-#ppt_w/2"/>
+                                          </p:val>
+                                        </p:tav>
+                                        <p:tav tm="100000">
+                                          <p:val>
+                                            <p:strVal val="#ppt_x"/>
+                                          </p:val>
+                                        </p:tav>
+                                      </p:tavLst>
+                                    </p:anim>
+                                    <p:anim calcmode="lin" valueType="num">
+                                      <p:cBhvr additive="base">
+                                        <p:cTn id="8" dur="1500" fill="hold"/>
+                                        <p:tgtEl>
+                                          <p:spTgt spid="4"/>
+                                        </p:tgtEl>
+                                        <p:attrNameLst>
+                                          <p:attrName>ppt_y</p:attrName>
+                                        </p:attrNameLst>
+                                      </p:cBhvr>
+                                      <p:tavLst>
+                                        <p:tav tm="0">
+                                          <p:val>
+                                            <p:strVal val="#ppt_y"/>
+                                          </p:val>
+                                        </p:tav>
+                                        <p:tav tm="100000">
+                                          <p:val>
+                                            <p:strVal val="#ppt_y"/>
+                                          </p:val>
+                                        </p:tav>
+                                      </p:tavLst>
+                                    </p:anim>
+                                  </p:childTnLst>
+                                </p:cTn>
+                              </p:par>
+                            </p:childTnLst>
+                          </p:cTn>
+                        </p:par>
+                      </p:childTnLst>
+                    </p:cTn>
+                  </p:par>
+                </p:childTnLst>
+              </p:cTn>
+              <p:prevCondLst>
+                <p:cond evt="onPrev" delay="0">
+                  <p:tgtEl>
+                    <p:sldTgt/>
+                  </p:tgtEl>
+                </p:cond>
+              </p:prevCondLst>
+              <p:nextCondLst>
+                <p:cond evt="onNext" delay="0">
+                  <p:tgtEl>
+                    <p:sldTgt/>
+                  </p:tgtEl>
+                </p:cond>
+              </p:nextCondLst>
+            </p:seq>
+          </p:childTnLst>
+        </p:cTn>
+      </p:par>
+    </p:tnLst>
+  </p:timing>
+</p:sld>
+</file>
+
+<file path=ppt/slides/slide11.xml><?xml version="1.0" encoding="utf-8"?>
+<p:sld xmlns:a="http://schemas.openxmlformats.org/drawingml/2006/main" xmlns:r="http://schemas.openxmlformats.org/officeDocument/2006/relationships" xmlns:p="http://schemas.openxmlformats.org/presentationml/2006/main">
+  <p:cSld>
+    <p:spTree>
+      <p:nvGrpSpPr>
+        <p:cNvPr id="1" name=""/>
+        <p:cNvGrpSpPr/>
+        <p:nvPr/>
+      </p:nvGrpSpPr>
+      <p:grpSpPr>
+        <a:xfrm>
+          <a:off x="0" y="0"/>
+          <a:ext cx="0" cy="0"/>
+          <a:chOff x="0" y="0"/>
+          <a:chExt cx="0" cy="0"/>
+        </a:xfrm>
+      </p:grpSpPr>
       <p:pic>
         <p:nvPicPr>
           <p:cNvPr id="3" name="Picture 2" descr="A graph on a black background&#10;&#10;AI-generated content may be incorrect.">
@@ -7006,7 +7307,7 @@
 </p:sld>
 </file>
 
-<file path=ppt/slides/slide11.xml><?xml version="1.0" encoding="utf-8"?>
+<file path=ppt/slides/slide12.xml><?xml version="1.0" encoding="utf-8"?>
 <p:sld xmlns:a="http://schemas.openxmlformats.org/drawingml/2006/main" xmlns:r="http://schemas.openxmlformats.org/officeDocument/2006/relationships" xmlns:p="http://schemas.openxmlformats.org/presentationml/2006/main">
   <p:cSld>
     <p:spTree>
@@ -7973,7 +8274,7 @@
 </p:sld>
 </file>
 
-<file path=ppt/slides/slide12.xml><?xml version="1.0" encoding="utf-8"?>
+<file path=ppt/slides/slide13.xml><?xml version="1.0" encoding="utf-8"?>
 <p:sld xmlns:a="http://schemas.openxmlformats.org/drawingml/2006/main" xmlns:r="http://schemas.openxmlformats.org/officeDocument/2006/relationships" xmlns:p="http://schemas.openxmlformats.org/presentationml/2006/main">
   <p:cSld>
     <p:spTree>
@@ -8134,7 +8435,7 @@
 </p:sld>
 </file>
 
-<file path=ppt/slides/slide13.xml><?xml version="1.0" encoding="utf-8"?>
+<file path=ppt/slides/slide14.xml><?xml version="1.0" encoding="utf-8"?>
 <p:sld xmlns:a="http://schemas.openxmlformats.org/drawingml/2006/main" xmlns:r="http://schemas.openxmlformats.org/officeDocument/2006/relationships" xmlns:p="http://schemas.openxmlformats.org/presentationml/2006/main">
   <p:cSld>
     <p:spTree>
@@ -8295,7 +8596,7 @@
 </p:sld>
 </file>
 
-<file path=ppt/slides/slide14.xml><?xml version="1.0" encoding="utf-8"?>
+<file path=ppt/slides/slide15.xml><?xml version="1.0" encoding="utf-8"?>
 <p:sld xmlns:a="http://schemas.openxmlformats.org/drawingml/2006/main" xmlns:r="http://schemas.openxmlformats.org/officeDocument/2006/relationships" xmlns:p="http://schemas.openxmlformats.org/presentationml/2006/main">
   <p:cSld>
     <p:spTree>
@@ -8551,7 +8852,7 @@
 </p:sld>
 </file>
 
-<file path=ppt/slides/slide15.xml><?xml version="1.0" encoding="utf-8"?>
+<file path=ppt/slides/slide16.xml><?xml version="1.0" encoding="utf-8"?>
 <p:sld xmlns:a="http://schemas.openxmlformats.org/drawingml/2006/main" xmlns:r="http://schemas.openxmlformats.org/officeDocument/2006/relationships" xmlns:p="http://schemas.openxmlformats.org/presentationml/2006/main">
   <p:cSld>
     <p:spTree>
@@ -8746,7 +9047,7 @@
 </p:sld>
 </file>
 
-<file path=ppt/slides/slide16.xml><?xml version="1.0" encoding="utf-8"?>
+<file path=ppt/slides/slide17.xml><?xml version="1.0" encoding="utf-8"?>
 <p:sld xmlns:a="http://schemas.openxmlformats.org/drawingml/2006/main" xmlns:r="http://schemas.openxmlformats.org/officeDocument/2006/relationships" xmlns:p="http://schemas.openxmlformats.org/presentationml/2006/main">
   <p:cSld>
     <p:spTree>

</xml_diff>